<commit_message>
updating slides for new project name
</commit_message>
<xml_diff>
--- a/ClassMaterials/RecursionIntroduction/Slides/Recursion.pptx
+++ b/ClassMaterials/RecursionIntroduction/Slides/Recursion.pptx
@@ -283,7 +283,7 @@
               <a:pPr>
                 <a:defRPr/>
               </a:pPr>
-              <a:t>9/26/2018</a:t>
+              <a:t>4/3/2020</a:t>
             </a:fld>
             <a:endParaRPr lang="en-US"/>
           </a:p>
@@ -518,7 +518,7 @@
               <a:pPr>
                 <a:defRPr/>
               </a:pPr>
-              <a:t>9/26/2018</a:t>
+              <a:t>4/3/2020</a:t>
             </a:fld>
             <a:endParaRPr lang="en-US"/>
           </a:p>
@@ -929,8 +929,8 @@
               <a:t>Bring hardcopy of code from </a:t>
             </a:r>
             <a:r>
-              <a:rPr lang="en-US" dirty="0" err="1"/>
-              <a:t>RecursionSolution</a:t>
+              <a:rPr lang="en-US" smtClean="0"/>
+              <a:t>RecursionInClassPracticeSolution</a:t>
             </a:r>
             <a:r>
               <a:rPr lang="en-US" dirty="0"/>
@@ -1098,7 +1098,7 @@
           </a:ln>
           <a:extLst>
             <a:ext uri="{909E8E84-426E-40dd-AFC4-6F175D3DCCD1}">
-              <a14:hiddenFill xmlns:a14="http://schemas.microsoft.com/office/drawing/2010/main" xmlns="">
+              <a14:hiddenFill xmlns="" xmlns:a14="http://schemas.microsoft.com/office/drawing/2010/main">
                 <a:solidFill>
                   <a:srgbClr val="FFFFFF"/>
                 </a:solidFill>
@@ -1122,14 +1122,14 @@
           <a:ln/>
           <a:extLst>
             <a:ext uri="{909E8E84-426E-40dd-AFC4-6F175D3DCCD1}">
-              <a14:hiddenFill xmlns:a14="http://schemas.microsoft.com/office/drawing/2010/main" xmlns="">
+              <a14:hiddenFill xmlns="" xmlns:a14="http://schemas.microsoft.com/office/drawing/2010/main">
                 <a:solidFill>
                   <a:srgbClr val="FFFFFF"/>
                 </a:solidFill>
               </a14:hiddenFill>
             </a:ext>
             <a:ext uri="{91240B29-F687-4f45-9708-019B960494DF}">
-              <a14:hiddenLine xmlns:a14="http://schemas.microsoft.com/office/drawing/2010/main" xmlns="" w="9525">
+              <a14:hiddenLine xmlns="" xmlns:a14="http://schemas.microsoft.com/office/drawing/2010/main" w="9525">
                 <a:solidFill>
                   <a:srgbClr val="000000"/>
                 </a:solidFill>
@@ -1163,14 +1163,14 @@
           <a:ln/>
           <a:extLst>
             <a:ext uri="{909E8E84-426E-40dd-AFC4-6F175D3DCCD1}">
-              <a14:hiddenFill xmlns:a14="http://schemas.microsoft.com/office/drawing/2010/main" xmlns="">
+              <a14:hiddenFill xmlns="" xmlns:a14="http://schemas.microsoft.com/office/drawing/2010/main">
                 <a:solidFill>
                   <a:srgbClr val="FFFFFF"/>
                 </a:solidFill>
               </a14:hiddenFill>
             </a:ext>
             <a:ext uri="{91240B29-F687-4f45-9708-019B960494DF}">
-              <a14:hiddenLine xmlns:a14="http://schemas.microsoft.com/office/drawing/2010/main" xmlns="" w="9525">
+              <a14:hiddenLine xmlns="" xmlns:a14="http://schemas.microsoft.com/office/drawing/2010/main" w="9525">
                 <a:solidFill>
                   <a:srgbClr val="000000"/>
                 </a:solidFill>
@@ -1357,7 +1357,7 @@
           </a:ln>
           <a:extLst>
             <a:ext uri="{909E8E84-426E-40dd-AFC4-6F175D3DCCD1}">
-              <a14:hiddenFill xmlns:a14="http://schemas.microsoft.com/office/drawing/2010/main" xmlns="">
+              <a14:hiddenFill xmlns="" xmlns:a14="http://schemas.microsoft.com/office/drawing/2010/main">
                 <a:solidFill>
                   <a:srgbClr val="FFFFFF"/>
                 </a:solidFill>
@@ -1381,14 +1381,14 @@
           <a:ln/>
           <a:extLst>
             <a:ext uri="{909E8E84-426E-40dd-AFC4-6F175D3DCCD1}">
-              <a14:hiddenFill xmlns:a14="http://schemas.microsoft.com/office/drawing/2010/main" xmlns="">
+              <a14:hiddenFill xmlns="" xmlns:a14="http://schemas.microsoft.com/office/drawing/2010/main">
                 <a:solidFill>
                   <a:srgbClr val="FFFFFF"/>
                 </a:solidFill>
               </a14:hiddenFill>
             </a:ext>
             <a:ext uri="{91240B29-F687-4f45-9708-019B960494DF}">
-              <a14:hiddenLine xmlns:a14="http://schemas.microsoft.com/office/drawing/2010/main" xmlns="" w="9525">
+              <a14:hiddenLine xmlns="" xmlns:a14="http://schemas.microsoft.com/office/drawing/2010/main" w="9525">
                 <a:solidFill>
                   <a:srgbClr val="000000"/>
                 </a:solidFill>
@@ -1474,14 +1474,14 @@
           <a:ln/>
           <a:extLst>
             <a:ext uri="{909E8E84-426E-40dd-AFC4-6F175D3DCCD1}">
-              <a14:hiddenFill xmlns:a14="http://schemas.microsoft.com/office/drawing/2010/main" xmlns="">
+              <a14:hiddenFill xmlns="" xmlns:a14="http://schemas.microsoft.com/office/drawing/2010/main">
                 <a:solidFill>
                   <a:srgbClr val="FFFFFF"/>
                 </a:solidFill>
               </a14:hiddenFill>
             </a:ext>
             <a:ext uri="{91240B29-F687-4f45-9708-019B960494DF}">
-              <a14:hiddenLine xmlns:a14="http://schemas.microsoft.com/office/drawing/2010/main" xmlns="" w="9525">
+              <a14:hiddenLine xmlns="" xmlns:a14="http://schemas.microsoft.com/office/drawing/2010/main" w="9525">
                 <a:solidFill>
                   <a:srgbClr val="000000"/>
                 </a:solidFill>
@@ -1998,7 +1998,7 @@
           </a:ln>
           <a:extLst>
             <a:ext uri="{909E8E84-426E-40dd-AFC4-6F175D3DCCD1}">
-              <a14:hiddenFill xmlns:a14="http://schemas.microsoft.com/office/drawing/2010/main" xmlns="">
+              <a14:hiddenFill xmlns="" xmlns:a14="http://schemas.microsoft.com/office/drawing/2010/main">
                 <a:solidFill>
                   <a:srgbClr val="FFFFFF"/>
                 </a:solidFill>
@@ -2022,14 +2022,14 @@
           <a:ln/>
           <a:extLst>
             <a:ext uri="{909E8E84-426E-40dd-AFC4-6F175D3DCCD1}">
-              <a14:hiddenFill xmlns:a14="http://schemas.microsoft.com/office/drawing/2010/main" xmlns="">
+              <a14:hiddenFill xmlns="" xmlns:a14="http://schemas.microsoft.com/office/drawing/2010/main">
                 <a:solidFill>
                   <a:srgbClr val="FFFFFF"/>
                 </a:solidFill>
               </a14:hiddenFill>
             </a:ext>
             <a:ext uri="{91240B29-F687-4f45-9708-019B960494DF}">
-              <a14:hiddenLine xmlns:a14="http://schemas.microsoft.com/office/drawing/2010/main" xmlns="" w="9525">
+              <a14:hiddenLine xmlns="" xmlns:a14="http://schemas.microsoft.com/office/drawing/2010/main" w="9525">
                 <a:solidFill>
                   <a:srgbClr val="000000"/>
                 </a:solidFill>
@@ -2105,14 +2105,14 @@
           <a:ln/>
           <a:extLst>
             <a:ext uri="{909E8E84-426E-40dd-AFC4-6F175D3DCCD1}">
-              <a14:hiddenFill xmlns:a14="http://schemas.microsoft.com/office/drawing/2010/main" xmlns="">
+              <a14:hiddenFill xmlns="" xmlns:a14="http://schemas.microsoft.com/office/drawing/2010/main">
                 <a:solidFill>
                   <a:srgbClr val="FFFFFF"/>
                 </a:solidFill>
               </a14:hiddenFill>
             </a:ext>
             <a:ext uri="{91240B29-F687-4f45-9708-019B960494DF}">
-              <a14:hiddenLine xmlns:a14="http://schemas.microsoft.com/office/drawing/2010/main" xmlns="" w="9525">
+              <a14:hiddenLine xmlns="" xmlns:a14="http://schemas.microsoft.com/office/drawing/2010/main" w="9525">
                 <a:solidFill>
                   <a:srgbClr val="000000"/>
                 </a:solidFill>
@@ -3020,7 +3020,7 @@
               <a:pPr>
                 <a:defRPr/>
               </a:pPr>
-              <a:t>Wednesday, September 26, 2018</a:t>
+              <a:t>Friday, April 3, 2020</a:t>
             </a:fld>
             <a:endParaRPr lang="en-US" dirty="0"/>
           </a:p>
@@ -3203,7 +3203,7 @@
               <a:pPr>
                 <a:defRPr/>
               </a:pPr>
-              <a:t>Wednesday, September 26, 2018</a:t>
+              <a:t>Friday, April 3, 2020</a:t>
             </a:fld>
             <a:endParaRPr lang="en-US" dirty="0"/>
           </a:p>
@@ -3396,7 +3396,7 @@
               <a:pPr>
                 <a:defRPr/>
               </a:pPr>
-              <a:t>Wednesday, September 26, 2018</a:t>
+              <a:t>Friday, April 3, 2020</a:t>
             </a:fld>
             <a:endParaRPr lang="en-US" dirty="0"/>
           </a:p>
@@ -3579,7 +3579,7 @@
               <a:pPr>
                 <a:defRPr/>
               </a:pPr>
-              <a:t>Wednesday, September 26, 2018</a:t>
+              <a:t>Friday, April 3, 2020</a:t>
             </a:fld>
             <a:endParaRPr lang="en-US" dirty="0"/>
           </a:p>
@@ -3839,7 +3839,7 @@
               <a:pPr>
                 <a:defRPr/>
               </a:pPr>
-              <a:t>Wednesday, September 26, 2018</a:t>
+              <a:t>Friday, April 3, 2020</a:t>
             </a:fld>
             <a:endParaRPr lang="en-US"/>
           </a:p>
@@ -4139,7 +4139,7 @@
               <a:pPr>
                 <a:defRPr/>
               </a:pPr>
-              <a:t>Wednesday, September 26, 2018</a:t>
+              <a:t>Friday, April 3, 2020</a:t>
             </a:fld>
             <a:endParaRPr lang="en-US"/>
           </a:p>
@@ -4573,7 +4573,7 @@
               <a:pPr>
                 <a:defRPr/>
               </a:pPr>
-              <a:t>Wednesday, September 26, 2018</a:t>
+              <a:t>Friday, April 3, 2020</a:t>
             </a:fld>
             <a:endParaRPr lang="en-US"/>
           </a:p>
@@ -4705,7 +4705,7 @@
               <a:pPr>
                 <a:defRPr/>
               </a:pPr>
-              <a:t>Wednesday, September 26, 2018</a:t>
+              <a:t>Friday, April 3, 2020</a:t>
             </a:fld>
             <a:endParaRPr lang="en-US"/>
           </a:p>
@@ -4815,7 +4815,7 @@
               <a:pPr>
                 <a:defRPr/>
               </a:pPr>
-              <a:t>Wednesday, September 26, 2018</a:t>
+              <a:t>Friday, April 3, 2020</a:t>
             </a:fld>
             <a:endParaRPr lang="en-US" dirty="0"/>
           </a:p>
@@ -5105,7 +5105,7 @@
               <a:pPr>
                 <a:defRPr/>
               </a:pPr>
-              <a:t>Wednesday, September 26, 2018</a:t>
+              <a:t>Friday, April 3, 2020</a:t>
             </a:fld>
             <a:endParaRPr lang="en-US"/>
           </a:p>
@@ -5372,7 +5372,7 @@
               <a:pPr>
                 <a:defRPr/>
               </a:pPr>
-              <a:t>Wednesday, September 26, 2018</a:t>
+              <a:t>Friday, April 3, 2020</a:t>
             </a:fld>
             <a:endParaRPr lang="en-US"/>
           </a:p>
@@ -5598,7 +5598,7 @@
               <a:pPr>
                 <a:defRPr/>
               </a:pPr>
-              <a:t>Wednesday, September 26, 2018</a:t>
+              <a:t>Friday, April 3, 2020</a:t>
             </a:fld>
             <a:endParaRPr lang="en-US" dirty="0"/>
           </a:p>
@@ -6088,7 +6088,7 @@
         <p:spPr>
           <a:xfrm>
             <a:off x="285750" y="6242050"/>
-            <a:ext cx="7486650" cy="523220"/>
+            <a:ext cx="8401050" cy="523220"/>
           </a:xfrm>
           <a:prstGeom prst="rect">
             <a:avLst/>
@@ -6124,18 +6124,17 @@
               <a:t>Import </a:t>
             </a:r>
             <a:r>
-              <a:rPr lang="en-US" sz="2800" i="1" dirty="0"/>
-              <a:t>Recursion</a:t>
+              <a:rPr lang="en-US" sz="2800" i="1" dirty="0" err="1" smtClean="0"/>
+              <a:t>RecursionInClassPractice</a:t>
+            </a:r>
+            <a:r>
+              <a:rPr lang="en-US" sz="2800" dirty="0" smtClean="0"/>
+              <a:t> </a:t>
             </a:r>
             <a:r>
               <a:rPr lang="en-US" sz="2800" dirty="0"/>
-              <a:t> project </a:t>
-            </a:r>
-            <a:r>
-              <a:rPr lang="en-US" sz="2800"/>
-              <a:t>from the repo</a:t>
-            </a:r>
-            <a:endParaRPr lang="en-US" sz="2800" dirty="0"/>
+              <a:t>project from the repo</a:t>
+            </a:r>
           </a:p>
         </p:txBody>
       </p:sp>
@@ -6321,6 +6320,10 @@
             <a:r>
               <a:rPr lang="en-US" b="1" dirty="0"/>
               <a:t>occurs repeatedly </a:t>
+            </a:r>
+            <a:r>
+              <a:rPr lang="en-US" dirty="0"/>
+              <a:t/>
             </a:r>
             <a:br>
               <a:rPr lang="en-US" dirty="0"/>

</xml_diff>